<commit_message>
Updates from committee feedback.
</commit_message>
<xml_diff>
--- a/6_interleaving_framework/images/CoveringBallSequence.pptx
+++ b/6_interleaving_framework/images/CoveringBallSequence.pptx
@@ -243,7 +243,7 @@
           <a:p>
             <a:fld id="{7078CFEC-1D61-41B2-9CE4-F79A0697D2D9}" type="datetimeFigureOut">
               <a:rPr lang="en-US" smtClean="0"/>
-              <a:t>2018-08-07</a:t>
+              <a:t>2020-05-08</a:t>
             </a:fld>
             <a:endParaRPr lang="en-US"/>
           </a:p>
@@ -413,7 +413,7 @@
           <a:p>
             <a:fld id="{7078CFEC-1D61-41B2-9CE4-F79A0697D2D9}" type="datetimeFigureOut">
               <a:rPr lang="en-US" smtClean="0"/>
-              <a:t>2018-08-07</a:t>
+              <a:t>2020-05-08</a:t>
             </a:fld>
             <a:endParaRPr lang="en-US"/>
           </a:p>
@@ -593,7 +593,7 @@
           <a:p>
             <a:fld id="{7078CFEC-1D61-41B2-9CE4-F79A0697D2D9}" type="datetimeFigureOut">
               <a:rPr lang="en-US" smtClean="0"/>
-              <a:t>2018-08-07</a:t>
+              <a:t>2020-05-08</a:t>
             </a:fld>
             <a:endParaRPr lang="en-US"/>
           </a:p>
@@ -763,7 +763,7 @@
           <a:p>
             <a:fld id="{7078CFEC-1D61-41B2-9CE4-F79A0697D2D9}" type="datetimeFigureOut">
               <a:rPr lang="en-US" smtClean="0"/>
-              <a:t>2018-08-07</a:t>
+              <a:t>2020-05-08</a:t>
             </a:fld>
             <a:endParaRPr lang="en-US"/>
           </a:p>
@@ -1009,7 +1009,7 @@
           <a:p>
             <a:fld id="{7078CFEC-1D61-41B2-9CE4-F79A0697D2D9}" type="datetimeFigureOut">
               <a:rPr lang="en-US" smtClean="0"/>
-              <a:t>2018-08-07</a:t>
+              <a:t>2020-05-08</a:t>
             </a:fld>
             <a:endParaRPr lang="en-US"/>
           </a:p>
@@ -1241,7 +1241,7 @@
           <a:p>
             <a:fld id="{7078CFEC-1D61-41B2-9CE4-F79A0697D2D9}" type="datetimeFigureOut">
               <a:rPr lang="en-US" smtClean="0"/>
-              <a:t>2018-08-07</a:t>
+              <a:t>2020-05-08</a:t>
             </a:fld>
             <a:endParaRPr lang="en-US"/>
           </a:p>
@@ -1608,7 +1608,7 @@
           <a:p>
             <a:fld id="{7078CFEC-1D61-41B2-9CE4-F79A0697D2D9}" type="datetimeFigureOut">
               <a:rPr lang="en-US" smtClean="0"/>
-              <a:t>2018-08-07</a:t>
+              <a:t>2020-05-08</a:t>
             </a:fld>
             <a:endParaRPr lang="en-US"/>
           </a:p>
@@ -1726,7 +1726,7 @@
           <a:p>
             <a:fld id="{7078CFEC-1D61-41B2-9CE4-F79A0697D2D9}" type="datetimeFigureOut">
               <a:rPr lang="en-US" smtClean="0"/>
-              <a:t>2018-08-07</a:t>
+              <a:t>2020-05-08</a:t>
             </a:fld>
             <a:endParaRPr lang="en-US"/>
           </a:p>
@@ -1821,7 +1821,7 @@
           <a:p>
             <a:fld id="{7078CFEC-1D61-41B2-9CE4-F79A0697D2D9}" type="datetimeFigureOut">
               <a:rPr lang="en-US" smtClean="0"/>
-              <a:t>2018-08-07</a:t>
+              <a:t>2020-05-08</a:t>
             </a:fld>
             <a:endParaRPr lang="en-US"/>
           </a:p>
@@ -2098,7 +2098,7 @@
           <a:p>
             <a:fld id="{7078CFEC-1D61-41B2-9CE4-F79A0697D2D9}" type="datetimeFigureOut">
               <a:rPr lang="en-US" smtClean="0"/>
-              <a:t>2018-08-07</a:t>
+              <a:t>2020-05-08</a:t>
             </a:fld>
             <a:endParaRPr lang="en-US"/>
           </a:p>
@@ -2355,7 +2355,7 @@
           <a:p>
             <a:fld id="{7078CFEC-1D61-41B2-9CE4-F79A0697D2D9}" type="datetimeFigureOut">
               <a:rPr lang="en-US" smtClean="0"/>
-              <a:t>2018-08-07</a:t>
+              <a:t>2020-05-08</a:t>
             </a:fld>
             <a:endParaRPr lang="en-US"/>
           </a:p>
@@ -2568,7 +2568,7 @@
           <a:p>
             <a:fld id="{7078CFEC-1D61-41B2-9CE4-F79A0697D2D9}" type="datetimeFigureOut">
               <a:rPr lang="en-US" smtClean="0"/>
-              <a:t>2018-08-07</a:t>
+              <a:t>2020-05-08</a:t>
             </a:fld>
             <a:endParaRPr lang="en-US"/>
           </a:p>
@@ -2973,8 +2973,8 @@
           <a:chExt cx="0" cy="0"/>
         </a:xfrm>
       </p:grpSpPr>
-      <mc:AlternateContent xmlns:mc="http://schemas.openxmlformats.org/markup-compatibility/2006">
-        <mc:Choice xmlns:a14="http://schemas.microsoft.com/office/drawing/2010/main" Requires="a14">
+      <mc:AlternateContent xmlns:mc="http://schemas.openxmlformats.org/markup-compatibility/2006" xmlns:a14="http://schemas.microsoft.com/office/drawing/2010/main">
+        <mc:Choice Requires="a14">
           <p:sp>
             <p:nvSpPr>
               <p:cNvPr id="62" name="TextBox 61">
@@ -3003,6 +3003,7 @@
               </a:bodyPr>
               <a:lstStyle/>
               <a:p>
+                <a:pPr/>
                 <a14:m>
                   <m:oMathPara xmlns:m="http://schemas.openxmlformats.org/officeDocument/2006/math">
                     <m:oMathParaPr>
@@ -3042,7 +3043,7 @@
             </p:txBody>
           </p:sp>
         </mc:Choice>
-        <mc:Fallback>
+        <mc:Fallback xmlns="">
           <p:sp>
             <p:nvSpPr>
               <p:cNvPr id="62" name="TextBox 61">
@@ -4182,8 +4183,8 @@
           </a:fontRef>
         </p:style>
       </p:cxnSp>
-      <mc:AlternateContent xmlns:mc="http://schemas.openxmlformats.org/markup-compatibility/2006">
-        <mc:Choice xmlns:a14="http://schemas.microsoft.com/office/drawing/2010/main" Requires="a14">
+      <mc:AlternateContent xmlns:mc="http://schemas.openxmlformats.org/markup-compatibility/2006" xmlns:a14="http://schemas.microsoft.com/office/drawing/2010/main">
+        <mc:Choice Requires="a14">
           <p:sp>
             <p:nvSpPr>
               <p:cNvPr id="86" name="TextBox 85">
@@ -4212,6 +4213,7 @@
               </a:bodyPr>
               <a:lstStyle/>
               <a:p>
+                <a:pPr/>
                 <a14:m>
                   <m:oMathPara xmlns:m="http://schemas.openxmlformats.org/officeDocument/2006/math">
                     <m:oMathParaPr>
@@ -4251,7 +4253,7 @@
             </p:txBody>
           </p:sp>
         </mc:Choice>
-        <mc:Fallback>
+        <mc:Fallback xmlns="">
           <p:sp>
             <p:nvSpPr>
               <p:cNvPr id="86" name="TextBox 85">
@@ -4296,8 +4298,8 @@
           </p:sp>
         </mc:Fallback>
       </mc:AlternateContent>
-      <mc:AlternateContent xmlns:mc="http://schemas.openxmlformats.org/markup-compatibility/2006">
-        <mc:Choice xmlns:a14="http://schemas.microsoft.com/office/drawing/2010/main" Requires="a14">
+      <mc:AlternateContent xmlns:mc="http://schemas.openxmlformats.org/markup-compatibility/2006" xmlns:a14="http://schemas.microsoft.com/office/drawing/2010/main">
+        <mc:Choice Requires="a14">
           <p:sp>
             <p:nvSpPr>
               <p:cNvPr id="87" name="TextBox 86">
@@ -4326,6 +4328,7 @@
               </a:bodyPr>
               <a:lstStyle/>
               <a:p>
+                <a:pPr/>
                 <a14:m>
                   <m:oMathPara xmlns:m="http://schemas.openxmlformats.org/officeDocument/2006/math">
                     <m:oMathParaPr>
@@ -4365,7 +4368,7 @@
             </p:txBody>
           </p:sp>
         </mc:Choice>
-        <mc:Fallback>
+        <mc:Fallback xmlns="">
           <p:sp>
             <p:nvSpPr>
               <p:cNvPr id="87" name="TextBox 86">
@@ -4410,8 +4413,8 @@
           </p:sp>
         </mc:Fallback>
       </mc:AlternateContent>
-      <mc:AlternateContent xmlns:mc="http://schemas.openxmlformats.org/markup-compatibility/2006">
-        <mc:Choice xmlns:a14="http://schemas.microsoft.com/office/drawing/2010/main" Requires="a14">
+      <mc:AlternateContent xmlns:mc="http://schemas.openxmlformats.org/markup-compatibility/2006" xmlns:a14="http://schemas.microsoft.com/office/drawing/2010/main">
+        <mc:Choice Requires="a14">
           <p:sp>
             <p:nvSpPr>
               <p:cNvPr id="88" name="TextBox 87">
@@ -4440,6 +4443,7 @@
               </a:bodyPr>
               <a:lstStyle/>
               <a:p>
+                <a:pPr/>
                 <a14:m>
                   <m:oMathPara xmlns:m="http://schemas.openxmlformats.org/officeDocument/2006/math">
                     <m:oMathParaPr>
@@ -4479,7 +4483,7 @@
             </p:txBody>
           </p:sp>
         </mc:Choice>
-        <mc:Fallback>
+        <mc:Fallback xmlns="">
           <p:sp>
             <p:nvSpPr>
               <p:cNvPr id="88" name="TextBox 87">
@@ -4524,8 +4528,8 @@
           </p:sp>
         </mc:Fallback>
       </mc:AlternateContent>
-      <mc:AlternateContent xmlns:mc="http://schemas.openxmlformats.org/markup-compatibility/2006">
-        <mc:Choice xmlns:a14="http://schemas.microsoft.com/office/drawing/2010/main" Requires="a14">
+      <mc:AlternateContent xmlns:mc="http://schemas.openxmlformats.org/markup-compatibility/2006" xmlns:a14="http://schemas.microsoft.com/office/drawing/2010/main">
+        <mc:Choice Requires="a14">
           <p:sp>
             <p:nvSpPr>
               <p:cNvPr id="89" name="TextBox 88">
@@ -4554,6 +4558,7 @@
               </a:bodyPr>
               <a:lstStyle/>
               <a:p>
+                <a:pPr/>
                 <a14:m>
                   <m:oMathPara xmlns:m="http://schemas.openxmlformats.org/officeDocument/2006/math">
                     <m:oMathParaPr>
@@ -4593,7 +4598,7 @@
             </p:txBody>
           </p:sp>
         </mc:Choice>
-        <mc:Fallback>
+        <mc:Fallback xmlns="">
           <p:sp>
             <p:nvSpPr>
               <p:cNvPr id="89" name="TextBox 88">
@@ -4638,8 +4643,8 @@
           </p:sp>
         </mc:Fallback>
       </mc:AlternateContent>
-      <mc:AlternateContent xmlns:mc="http://schemas.openxmlformats.org/markup-compatibility/2006">
-        <mc:Choice xmlns:a14="http://schemas.microsoft.com/office/drawing/2010/main" Requires="a14">
+      <mc:AlternateContent xmlns:mc="http://schemas.openxmlformats.org/markup-compatibility/2006" xmlns:a14="http://schemas.microsoft.com/office/drawing/2010/main">
+        <mc:Choice Requires="a14">
           <p:sp>
             <p:nvSpPr>
               <p:cNvPr id="90" name="TextBox 89">
@@ -4668,6 +4673,7 @@
               </a:bodyPr>
               <a:lstStyle/>
               <a:p>
+                <a:pPr/>
                 <a14:m>
                   <m:oMathPara xmlns:m="http://schemas.openxmlformats.org/officeDocument/2006/math">
                     <m:oMathParaPr>
@@ -4713,7 +4719,7 @@
             </p:txBody>
           </p:sp>
         </mc:Choice>
-        <mc:Fallback>
+        <mc:Fallback xmlns="">
           <p:sp>
             <p:nvSpPr>
               <p:cNvPr id="90" name="TextBox 89">
@@ -4758,8 +4764,8 @@
           </p:sp>
         </mc:Fallback>
       </mc:AlternateContent>
-      <mc:AlternateContent xmlns:mc="http://schemas.openxmlformats.org/markup-compatibility/2006">
-        <mc:Choice xmlns:a14="http://schemas.microsoft.com/office/drawing/2010/main" Requires="a14">
+      <mc:AlternateContent xmlns:mc="http://schemas.openxmlformats.org/markup-compatibility/2006" xmlns:a14="http://schemas.microsoft.com/office/drawing/2010/main">
+        <mc:Choice Requires="a14">
           <p:sp>
             <p:nvSpPr>
               <p:cNvPr id="91" name="TextBox 90">
@@ -4788,6 +4794,7 @@
               </a:bodyPr>
               <a:lstStyle/>
               <a:p>
+                <a:pPr/>
                 <a14:m>
                   <m:oMathPara xmlns:m="http://schemas.openxmlformats.org/officeDocument/2006/math">
                     <m:oMathParaPr>
@@ -4833,7 +4840,7 @@
             </p:txBody>
           </p:sp>
         </mc:Choice>
-        <mc:Fallback>
+        <mc:Fallback xmlns="">
           <p:sp>
             <p:nvSpPr>
               <p:cNvPr id="91" name="TextBox 90">
@@ -4878,8 +4885,8 @@
           </p:sp>
         </mc:Fallback>
       </mc:AlternateContent>
-      <mc:AlternateContent xmlns:mc="http://schemas.openxmlformats.org/markup-compatibility/2006">
-        <mc:Choice xmlns:a14="http://schemas.microsoft.com/office/drawing/2010/main" Requires="a14">
+      <mc:AlternateContent xmlns:mc="http://schemas.openxmlformats.org/markup-compatibility/2006" xmlns:a14="http://schemas.microsoft.com/office/drawing/2010/main">
+        <mc:Choice Requires="a14">
           <p:sp>
             <p:nvSpPr>
               <p:cNvPr id="92" name="TextBox 91">
@@ -4908,6 +4915,7 @@
               </a:bodyPr>
               <a:lstStyle/>
               <a:p>
+                <a:pPr/>
                 <a14:m>
                   <m:oMathPara xmlns:m="http://schemas.openxmlformats.org/officeDocument/2006/math">
                     <m:oMathParaPr>
@@ -4947,7 +4955,7 @@
             </p:txBody>
           </p:sp>
         </mc:Choice>
-        <mc:Fallback>
+        <mc:Fallback xmlns="">
           <p:sp>
             <p:nvSpPr>
               <p:cNvPr id="92" name="TextBox 91">
@@ -4992,8 +5000,8 @@
           </p:sp>
         </mc:Fallback>
       </mc:AlternateContent>
-      <mc:AlternateContent xmlns:mc="http://schemas.openxmlformats.org/markup-compatibility/2006">
-        <mc:Choice xmlns:a14="http://schemas.microsoft.com/office/drawing/2010/main" Requires="a14">
+      <mc:AlternateContent xmlns:mc="http://schemas.openxmlformats.org/markup-compatibility/2006" xmlns:a14="http://schemas.microsoft.com/office/drawing/2010/main">
+        <mc:Choice Requires="a14">
           <p:sp>
             <p:nvSpPr>
               <p:cNvPr id="93" name="TextBox 92">
@@ -5022,6 +5030,7 @@
               </a:bodyPr>
               <a:lstStyle/>
               <a:p>
+                <a:pPr/>
                 <a14:m>
                   <m:oMathPara xmlns:m="http://schemas.openxmlformats.org/officeDocument/2006/math">
                     <m:oMathParaPr>
@@ -5061,7 +5070,7 @@
             </p:txBody>
           </p:sp>
         </mc:Choice>
-        <mc:Fallback>
+        <mc:Fallback xmlns="">
           <p:sp>
             <p:nvSpPr>
               <p:cNvPr id="93" name="TextBox 92">
@@ -5192,8 +5201,8 @@
           </a:fontRef>
         </p:style>
       </p:cxnSp>
-      <mc:AlternateContent xmlns:mc="http://schemas.openxmlformats.org/markup-compatibility/2006">
-        <mc:Choice xmlns:a14="http://schemas.microsoft.com/office/drawing/2010/main" Requires="a14">
+      <mc:AlternateContent xmlns:mc="http://schemas.openxmlformats.org/markup-compatibility/2006" xmlns:a14="http://schemas.microsoft.com/office/drawing/2010/main">
+        <mc:Choice Requires="a14">
           <p:sp>
             <p:nvSpPr>
               <p:cNvPr id="96" name="TextBox 95">
@@ -5222,6 +5231,7 @@
               </a:bodyPr>
               <a:lstStyle/>
               <a:p>
+                <a:pPr/>
                 <a14:m>
                   <m:oMathPara xmlns:m="http://schemas.openxmlformats.org/officeDocument/2006/math">
                     <m:oMathParaPr>
@@ -5242,7 +5252,7 @@
             </p:txBody>
           </p:sp>
         </mc:Choice>
-        <mc:Fallback>
+        <mc:Fallback xmlns="">
           <p:sp>
             <p:nvSpPr>
               <p:cNvPr id="96" name="TextBox 95">
@@ -5287,8 +5297,8 @@
           </p:sp>
         </mc:Fallback>
       </mc:AlternateContent>
-      <mc:AlternateContent xmlns:mc="http://schemas.openxmlformats.org/markup-compatibility/2006">
-        <mc:Choice xmlns:a14="http://schemas.microsoft.com/office/drawing/2010/main" Requires="a14">
+      <mc:AlternateContent xmlns:mc="http://schemas.openxmlformats.org/markup-compatibility/2006" xmlns:a14="http://schemas.microsoft.com/office/drawing/2010/main">
+        <mc:Choice Requires="a14">
           <p:sp>
             <p:nvSpPr>
               <p:cNvPr id="97" name="TextBox 96">
@@ -5317,6 +5327,7 @@
               </a:bodyPr>
               <a:lstStyle/>
               <a:p>
+                <a:pPr/>
                 <a14:m>
                   <m:oMathPara xmlns:m="http://schemas.openxmlformats.org/officeDocument/2006/math">
                     <m:oMathParaPr>
@@ -5337,7 +5348,7 @@
             </p:txBody>
           </p:sp>
         </mc:Choice>
-        <mc:Fallback>
+        <mc:Fallback xmlns="">
           <p:sp>
             <p:nvSpPr>
               <p:cNvPr id="97" name="TextBox 96">
@@ -5399,7 +5410,7 @@
             <p:spPr>
               <a:xfrm>
                 <a:off x="1973500" y="877338"/>
-                <a:ext cx="441064" cy="257058"/>
+                <a:ext cx="441064" cy="246221"/>
               </a:xfrm>
               <a:prstGeom prst="rect">
                 <a:avLst/>
@@ -5412,6 +5423,7 @@
               </a:bodyPr>
               <a:lstStyle/>
               <a:p>
+                <a:pPr/>
                 <a14:m>
                   <m:oMathPara xmlns:m="http://schemas.openxmlformats.org/officeDocument/2006/math">
                     <m:oMathParaPr>
@@ -5440,18 +5452,6 @@
                               <a:latin typeface="Cambria Math" panose="02040503050406030204" pitchFamily="18" charset="0"/>
                             </a:rPr>
                             <m:t>𝑘</m:t>
-                          </m:r>
-                          <m:r>
-                            <a:rPr lang="en-US" sz="1000" b="0" i="1" smtClean="0">
-                              <a:latin typeface="Cambria Math" panose="02040503050406030204" pitchFamily="18" charset="0"/>
-                            </a:rPr>
-                            <m:t>,</m:t>
-                          </m:r>
-                          <m:r>
-                            <a:rPr lang="en-US" sz="1000" b="0" i="1" smtClean="0">
-                              <a:latin typeface="Cambria Math" panose="02040503050406030204" pitchFamily="18" charset="0"/>
-                            </a:rPr>
-                            <m:t>𝑟</m:t>
                           </m:r>
                         </m:sub>
                         <m:sup>
@@ -5489,7 +5489,7 @@
             <p:spPr>
               <a:xfrm>
                 <a:off x="1973500" y="877338"/>
-                <a:ext cx="441064" cy="257058"/>
+                <a:ext cx="441064" cy="246221"/>
               </a:xfrm>
               <a:prstGeom prst="rect">
                 <a:avLst/>
@@ -5533,7 +5533,7 @@
             <p:spPr>
               <a:xfrm>
                 <a:off x="923925" y="902467"/>
-                <a:ext cx="441064" cy="257058"/>
+                <a:ext cx="441064" cy="246221"/>
               </a:xfrm>
               <a:prstGeom prst="rect">
                 <a:avLst/>
@@ -5546,6 +5546,7 @@
               </a:bodyPr>
               <a:lstStyle/>
               <a:p>
+                <a:pPr/>
                 <a14:m>
                   <m:oMathPara xmlns:m="http://schemas.openxmlformats.org/officeDocument/2006/math">
                     <m:oMathParaPr>
@@ -5579,13 +5580,7 @@
                             <a:rPr lang="en-US" sz="1000" b="0" i="1" smtClean="0">
                               <a:latin typeface="Cambria Math" panose="02040503050406030204" pitchFamily="18" charset="0"/>
                             </a:rPr>
-                            <m:t>−1,</m:t>
-                          </m:r>
-                          <m:r>
-                            <a:rPr lang="en-US" sz="1000" b="0" i="1" smtClean="0">
-                              <a:latin typeface="Cambria Math" panose="02040503050406030204" pitchFamily="18" charset="0"/>
-                            </a:rPr>
-                            <m:t>𝑟</m:t>
+                            <m:t>−1</m:t>
                           </m:r>
                         </m:sub>
                         <m:sup>
@@ -5623,7 +5618,7 @@
             <p:spPr>
               <a:xfrm>
                 <a:off x="923925" y="902467"/>
-                <a:ext cx="441064" cy="257058"/>
+                <a:ext cx="441064" cy="246221"/>
               </a:xfrm>
               <a:prstGeom prst="rect">
                 <a:avLst/>

</xml_diff>